<commit_message>
Updated agian - fixed typo
</commit_message>
<xml_diff>
--- a/Observer (Beobachter).pptx
+++ b/Observer (Beobachter).pptx
@@ -516,195 +516,6 @@
           <a:bodyPr/>
           <a:lstStyle/>
           <a:p>
-            <a:r>
-              <a:rPr lang="de-DE" dirty="0"/>
-              <a:t>Problem als Frage verpacken in der Präsentation</a:t>
-            </a:r>
-          </a:p>
-          <a:p>
-            <a:endParaRPr lang="de-DE" dirty="0"/>
-          </a:p>
-          <a:p>
-            <a:r>
-              <a:rPr lang="de-DE" sz="1200" b="1" i="0" kern="1200" dirty="0">
-                <a:solidFill>
-                  <a:schemeClr val="tx1"/>
-                </a:solidFill>
-                <a:effectLst/>
-                <a:latin typeface="+mn-lt"/>
-                <a:ea typeface="+mn-ea"/>
-                <a:cs typeface="+mn-cs"/>
-              </a:rPr>
-              <a:t>Problemstellung</a:t>
-            </a:r>
-          </a:p>
-          <a:p>
-            <a:r>
-              <a:rPr lang="de-DE" sz="1200" b="0" i="0" kern="1200" dirty="0">
-                <a:solidFill>
-                  <a:schemeClr val="tx1"/>
-                </a:solidFill>
-                <a:effectLst/>
-                <a:latin typeface="+mn-lt"/>
-                <a:ea typeface="+mn-ea"/>
-                <a:cs typeface="+mn-cs"/>
-              </a:rPr>
-              <a:t>Mehrere Objekte (Observer) interessieren sich für Änderungen im Zustand eines anderen Objekts (</a:t>
-            </a:r>
-            <a:r>
-              <a:rPr lang="de-DE" sz="1200" b="0" i="0" kern="1200" dirty="0" err="1">
-                <a:solidFill>
-                  <a:schemeClr val="tx1"/>
-                </a:solidFill>
-                <a:effectLst/>
-                <a:latin typeface="+mn-lt"/>
-                <a:ea typeface="+mn-ea"/>
-                <a:cs typeface="+mn-cs"/>
-              </a:rPr>
-              <a:t>Subject</a:t>
-            </a:r>
-            <a:r>
-              <a:rPr lang="de-DE" sz="1200" b="0" i="0" kern="1200" dirty="0">
-                <a:solidFill>
-                  <a:schemeClr val="tx1"/>
-                </a:solidFill>
-                <a:effectLst/>
-                <a:latin typeface="+mn-lt"/>
-                <a:ea typeface="+mn-ea"/>
-                <a:cs typeface="+mn-cs"/>
-              </a:rPr>
-              <a:t>).</a:t>
-            </a:r>
-          </a:p>
-          <a:p>
-            <a:r>
-              <a:rPr lang="de-DE" sz="1200" b="0" i="0" kern="1200" dirty="0">
-                <a:solidFill>
-                  <a:schemeClr val="tx1"/>
-                </a:solidFill>
-                <a:effectLst/>
-                <a:latin typeface="+mn-lt"/>
-                <a:ea typeface="+mn-ea"/>
-                <a:cs typeface="+mn-cs"/>
-              </a:rPr>
-              <a:t>Ohne Pattern müsste das </a:t>
-            </a:r>
-            <a:r>
-              <a:rPr lang="de-DE" sz="1200" b="0" i="0" kern="1200" dirty="0" err="1">
-                <a:solidFill>
-                  <a:schemeClr val="tx1"/>
-                </a:solidFill>
-                <a:effectLst/>
-                <a:latin typeface="+mn-lt"/>
-                <a:ea typeface="+mn-ea"/>
-                <a:cs typeface="+mn-cs"/>
-              </a:rPr>
-              <a:t>Subject</a:t>
-            </a:r>
-            <a:r>
-              <a:rPr lang="de-DE" sz="1200" b="0" i="0" kern="1200" dirty="0">
-                <a:solidFill>
-                  <a:schemeClr val="tx1"/>
-                </a:solidFill>
-                <a:effectLst/>
-                <a:latin typeface="+mn-lt"/>
-                <a:ea typeface="+mn-ea"/>
-                <a:cs typeface="+mn-cs"/>
-              </a:rPr>
-              <a:t> </a:t>
-            </a:r>
-            <a:r>
-              <a:rPr lang="de-DE" sz="1200" b="1" i="0" kern="1200" dirty="0">
-                <a:solidFill>
-                  <a:schemeClr val="tx1"/>
-                </a:solidFill>
-                <a:effectLst/>
-                <a:latin typeface="+mn-lt"/>
-                <a:ea typeface="+mn-ea"/>
-                <a:cs typeface="+mn-cs"/>
-              </a:rPr>
-              <a:t>hart codiert</a:t>
-            </a:r>
-            <a:r>
-              <a:rPr lang="de-DE" sz="1200" b="0" i="0" kern="1200" dirty="0">
-                <a:solidFill>
-                  <a:schemeClr val="tx1"/>
-                </a:solidFill>
-                <a:effectLst/>
-                <a:latin typeface="+mn-lt"/>
-                <a:ea typeface="+mn-ea"/>
-                <a:cs typeface="+mn-cs"/>
-              </a:rPr>
-              <a:t> wissen, welche Observer es benachrichtigen muss → enge Kopplung.</a:t>
-            </a:r>
-          </a:p>
-          <a:p>
-            <a:r>
-              <a:rPr lang="de-DE" sz="1200" b="0" i="0" kern="1200" dirty="0">
-                <a:solidFill>
-                  <a:schemeClr val="tx1"/>
-                </a:solidFill>
-                <a:effectLst/>
-                <a:latin typeface="+mn-lt"/>
-                <a:ea typeface="+mn-ea"/>
-                <a:cs typeface="+mn-cs"/>
-              </a:rPr>
-              <a:t>Das macht die Architektur </a:t>
-            </a:r>
-            <a:r>
-              <a:rPr lang="de-DE" sz="1200" b="1" i="0" kern="1200" dirty="0">
-                <a:solidFill>
-                  <a:schemeClr val="tx1"/>
-                </a:solidFill>
-                <a:effectLst/>
-                <a:latin typeface="+mn-lt"/>
-                <a:ea typeface="+mn-ea"/>
-                <a:cs typeface="+mn-cs"/>
-              </a:rPr>
-              <a:t>unflexibel und schwer erweiterbar</a:t>
-            </a:r>
-            <a:r>
-              <a:rPr lang="de-DE" sz="1200" b="0" i="0" kern="1200" dirty="0">
-                <a:solidFill>
-                  <a:schemeClr val="tx1"/>
-                </a:solidFill>
-                <a:effectLst/>
-                <a:latin typeface="+mn-lt"/>
-                <a:ea typeface="+mn-ea"/>
-                <a:cs typeface="+mn-cs"/>
-              </a:rPr>
-              <a:t>.</a:t>
-            </a:r>
-          </a:p>
-          <a:p>
-            <a:endParaRPr lang="de-DE" sz="1200" b="0" i="0" kern="1200" dirty="0">
-              <a:solidFill>
-                <a:schemeClr val="tx1"/>
-              </a:solidFill>
-              <a:effectLst/>
-              <a:latin typeface="+mn-lt"/>
-              <a:ea typeface="+mn-ea"/>
-              <a:cs typeface="+mn-cs"/>
-            </a:endParaRPr>
-          </a:p>
-          <a:p>
-            <a:r>
-              <a:rPr lang="de-DE" sz="1200" b="0" i="0" kern="1200" dirty="0">
-                <a:solidFill>
-                  <a:schemeClr val="tx1"/>
-                </a:solidFill>
-                <a:effectLst/>
-                <a:latin typeface="+mn-lt"/>
-                <a:ea typeface="+mn-ea"/>
-                <a:cs typeface="+mn-cs"/>
-              </a:rPr>
-              <a:t>Beispiel: Eine Wetterstation misst Temperaturen, verschiedene Displays und Logger wollen informiert werden, wenn sich die Temperatur ändert.</a:t>
-            </a:r>
-          </a:p>
-          <a:p>
-            <a:br>
-              <a:rPr lang="de-DE" dirty="0"/>
-            </a:br>
             <a:endParaRPr lang="de-DE" dirty="0"/>
           </a:p>
         </p:txBody>
@@ -726,7 +537,7 @@
           <a:p>
             <a:fld id="{9479FC98-DDC4-40A5-90CB-37FFA02134FB}" type="slidenum">
               <a:rPr lang="de-DE" smtClean="0"/>
-              <a:t>3</a:t>
+              <a:t>1</a:t>
             </a:fld>
             <a:endParaRPr lang="de-DE"/>
           </a:p>
@@ -735,7 +546,7 @@
     </p:spTree>
     <p:extLst>
       <p:ext uri="{BB962C8B-B14F-4D97-AF65-F5344CB8AC3E}">
-        <p14:creationId xmlns:p14="http://schemas.microsoft.com/office/powerpoint/2010/main" val="1334925992"/>
+        <p14:creationId xmlns:p14="http://schemas.microsoft.com/office/powerpoint/2010/main" val="845953316"/>
       </p:ext>
     </p:extLst>
   </p:cSld>
@@ -789,146 +600,195 @@
           <a:bodyPr/>
           <a:lstStyle/>
           <a:p>
-            <a:pPr marL="0" marR="0" lvl="0" indent="0" algn="l" defTabSz="914400" rtl="0" eaLnBrk="1" fontAlgn="auto" latinLnBrk="0" hangingPunct="1">
-              <a:lnSpc>
-                <a:spcPct val="100000"/>
-              </a:lnSpc>
-              <a:spcBef>
-                <a:spcPts val="0"/>
-              </a:spcBef>
-              <a:spcAft>
-                <a:spcPts val="0"/>
-              </a:spcAft>
-              <a:buClrTx/>
-              <a:buSzTx/>
-              <a:buFontTx/>
-              <a:buNone/>
-              <a:tabLst/>
-              <a:defRPr/>
-            </a:pPr>
-            <a:r>
-              <a:rPr lang="de-DE" sz="1200" dirty="0"/>
-              <a:t>Die Grundidee des Musters, das mehrere Objekte informiert werden, sobald sich der Zustand eines bestimmten </a:t>
-            </a:r>
             <a:r>
               <a:rPr lang="de-DE" dirty="0"/>
-              <a:t>Subjekts</a:t>
-            </a:r>
-            <a:r>
-              <a:rPr lang="de-DE" sz="1200" dirty="0"/>
-              <a:t> sich ändert. </a:t>
-            </a:r>
-          </a:p>
-          <a:p>
-            <a:pPr marL="0" marR="0" lvl="0" indent="0" algn="l" defTabSz="914400" rtl="0" eaLnBrk="1" fontAlgn="auto" latinLnBrk="0" hangingPunct="1">
-              <a:lnSpc>
-                <a:spcPct val="100000"/>
-              </a:lnSpc>
-              <a:spcBef>
-                <a:spcPts val="0"/>
-              </a:spcBef>
-              <a:spcAft>
-                <a:spcPts val="0"/>
-              </a:spcAft>
-              <a:buClrTx/>
-              <a:buSzTx/>
-              <a:buFontTx/>
-              <a:buNone/>
-              <a:tabLst/>
-              <a:defRPr/>
-            </a:pPr>
-            <a:r>
-              <a:rPr lang="de-DE" sz="1200" dirty="0"/>
-              <a:t>Das </a:t>
-            </a:r>
-            <a:r>
+              <a:t>Problem als Frage verpacken in der Präsentation</a:t>
+            </a:r>
+          </a:p>
+          <a:p>
+            <a:endParaRPr lang="de-DE" dirty="0"/>
+          </a:p>
+          <a:p>
+            <a:r>
+              <a:rPr lang="de-DE" sz="1200" b="1" i="0" kern="1200" dirty="0">
+                <a:solidFill>
+                  <a:schemeClr val="tx1"/>
+                </a:solidFill>
+                <a:effectLst/>
+                <a:latin typeface="+mn-lt"/>
+                <a:ea typeface="+mn-ea"/>
+                <a:cs typeface="+mn-cs"/>
+              </a:rPr>
+              <a:t>Problemstellung</a:t>
+            </a:r>
+          </a:p>
+          <a:p>
+            <a:r>
+              <a:rPr lang="de-DE" sz="1200" b="0" i="0" kern="1200" dirty="0">
+                <a:solidFill>
+                  <a:schemeClr val="tx1"/>
+                </a:solidFill>
+                <a:effectLst/>
+                <a:latin typeface="+mn-lt"/>
+                <a:ea typeface="+mn-ea"/>
+                <a:cs typeface="+mn-cs"/>
+              </a:rPr>
+              <a:t>Mehrere Objekte (Observer) interessieren sich für Änderungen im Zustand eines anderen Objekts (</a:t>
+            </a:r>
+            <a:r>
+              <a:rPr lang="de-DE" sz="1200" b="0" i="0" kern="1200" dirty="0" err="1">
+                <a:solidFill>
+                  <a:schemeClr val="tx1"/>
+                </a:solidFill>
+                <a:effectLst/>
+                <a:latin typeface="+mn-lt"/>
+                <a:ea typeface="+mn-ea"/>
+                <a:cs typeface="+mn-cs"/>
+              </a:rPr>
+              <a:t>Subject</a:t>
+            </a:r>
+            <a:r>
+              <a:rPr lang="de-DE" sz="1200" b="0" i="0" kern="1200" dirty="0">
+                <a:solidFill>
+                  <a:schemeClr val="tx1"/>
+                </a:solidFill>
+                <a:effectLst/>
+                <a:latin typeface="+mn-lt"/>
+                <a:ea typeface="+mn-ea"/>
+                <a:cs typeface="+mn-cs"/>
+              </a:rPr>
+              <a:t>).</a:t>
+            </a:r>
+          </a:p>
+          <a:p>
+            <a:r>
+              <a:rPr lang="de-DE" sz="1200" b="0" i="0" kern="1200" dirty="0">
+                <a:solidFill>
+                  <a:schemeClr val="tx1"/>
+                </a:solidFill>
+                <a:effectLst/>
+                <a:latin typeface="+mn-lt"/>
+                <a:ea typeface="+mn-ea"/>
+                <a:cs typeface="+mn-cs"/>
+              </a:rPr>
+              <a:t>Ohne Pattern müsste das </a:t>
+            </a:r>
+            <a:r>
+              <a:rPr lang="de-DE" sz="1200" b="0" i="0" kern="1200" dirty="0" err="1">
+                <a:solidFill>
+                  <a:schemeClr val="tx1"/>
+                </a:solidFill>
+                <a:effectLst/>
+                <a:latin typeface="+mn-lt"/>
+                <a:ea typeface="+mn-ea"/>
+                <a:cs typeface="+mn-cs"/>
+              </a:rPr>
+              <a:t>Subject</a:t>
+            </a:r>
+            <a:r>
+              <a:rPr lang="de-DE" sz="1200" b="0" i="0" kern="1200" dirty="0">
+                <a:solidFill>
+                  <a:schemeClr val="tx1"/>
+                </a:solidFill>
+                <a:effectLst/>
+                <a:latin typeface="+mn-lt"/>
+                <a:ea typeface="+mn-ea"/>
+                <a:cs typeface="+mn-cs"/>
+              </a:rPr>
+              <a:t> </a:t>
+            </a:r>
+            <a:r>
+              <a:rPr lang="de-DE" sz="1200" b="1" i="0" kern="1200" dirty="0">
+                <a:solidFill>
+                  <a:schemeClr val="tx1"/>
+                </a:solidFill>
+                <a:effectLst/>
+                <a:latin typeface="+mn-lt"/>
+                <a:ea typeface="+mn-ea"/>
+                <a:cs typeface="+mn-cs"/>
+              </a:rPr>
+              <a:t>hart codiert</a:t>
+            </a:r>
+            <a:r>
+              <a:rPr lang="de-DE" sz="1200" b="0" i="0" kern="1200" dirty="0">
+                <a:solidFill>
+                  <a:schemeClr val="tx1"/>
+                </a:solidFill>
+                <a:effectLst/>
+                <a:latin typeface="+mn-lt"/>
+                <a:ea typeface="+mn-ea"/>
+                <a:cs typeface="+mn-cs"/>
+              </a:rPr>
+              <a:t> wissen, welche Observer es benachrichtigen muss → enge Kopplung.</a:t>
+            </a:r>
+          </a:p>
+          <a:p>
+            <a:r>
+              <a:rPr lang="de-DE" sz="1200" b="0" i="0" kern="1200" dirty="0">
+                <a:solidFill>
+                  <a:schemeClr val="tx1"/>
+                </a:solidFill>
+                <a:effectLst/>
+                <a:latin typeface="+mn-lt"/>
+                <a:ea typeface="+mn-ea"/>
+                <a:cs typeface="+mn-cs"/>
+              </a:rPr>
+              <a:t>Das macht die Architektur </a:t>
+            </a:r>
+            <a:r>
+              <a:rPr lang="de-DE" sz="1200" b="1" i="0" kern="1200" dirty="0">
+                <a:solidFill>
+                  <a:schemeClr val="tx1"/>
+                </a:solidFill>
+                <a:effectLst/>
+                <a:latin typeface="+mn-lt"/>
+                <a:ea typeface="+mn-ea"/>
+                <a:cs typeface="+mn-cs"/>
+              </a:rPr>
+              <a:t>unflexibel und schwer erweiterbar</a:t>
+            </a:r>
+            <a:r>
+              <a:rPr lang="de-DE" sz="1200" b="0" i="0" kern="1200" dirty="0">
+                <a:solidFill>
+                  <a:schemeClr val="tx1"/>
+                </a:solidFill>
+                <a:effectLst/>
+                <a:latin typeface="+mn-lt"/>
+                <a:ea typeface="+mn-ea"/>
+                <a:cs typeface="+mn-cs"/>
+              </a:rPr>
+              <a:t>.</a:t>
+            </a:r>
+          </a:p>
+          <a:p>
+            <a:endParaRPr lang="de-DE" sz="1200" b="0" i="0" kern="1200" dirty="0">
+              <a:solidFill>
+                <a:schemeClr val="tx1"/>
+              </a:solidFill>
+              <a:effectLst/>
+              <a:latin typeface="+mn-lt"/>
+              <a:ea typeface="+mn-ea"/>
+              <a:cs typeface="+mn-cs"/>
+            </a:endParaRPr>
+          </a:p>
+          <a:p>
+            <a:r>
+              <a:rPr lang="de-DE" sz="1200" b="0" i="0" kern="1200" dirty="0">
+                <a:solidFill>
+                  <a:schemeClr val="tx1"/>
+                </a:solidFill>
+                <a:effectLst/>
+                <a:latin typeface="+mn-lt"/>
+                <a:ea typeface="+mn-ea"/>
+                <a:cs typeface="+mn-cs"/>
+              </a:rPr>
+              <a:t>Beispiel: Eine Wetterstation misst Temperaturen, verschiedene Displays und Logger wollen informiert werden, wenn sich die Temperatur ändert.</a:t>
+            </a:r>
+          </a:p>
+          <a:p>
+            <a:br>
               <a:rPr lang="de-DE" dirty="0"/>
-              <a:t>Subjekt</a:t>
-            </a:r>
-            <a:r>
-              <a:rPr lang="de-DE" sz="1200" dirty="0"/>
-              <a:t> ist Objekt, welches wir beobachten. </a:t>
-            </a:r>
-          </a:p>
-          <a:p>
-            <a:pPr marL="0" marR="0" lvl="0" indent="0" algn="l" defTabSz="914400" rtl="0" eaLnBrk="1" fontAlgn="auto" latinLnBrk="0" hangingPunct="1">
-              <a:lnSpc>
-                <a:spcPct val="100000"/>
-              </a:lnSpc>
-              <a:spcBef>
-                <a:spcPts val="0"/>
-              </a:spcBef>
-              <a:spcAft>
-                <a:spcPts val="0"/>
-              </a:spcAft>
-              <a:buClrTx/>
-              <a:buSzTx/>
-              <a:buFontTx/>
-              <a:buNone/>
-              <a:tabLst/>
-              <a:defRPr/>
-            </a:pPr>
-            <a:r>
-              <a:rPr lang="de-DE" sz="1200" dirty="0"/>
-              <a:t>Dabei gibt es ein </a:t>
-            </a:r>
-            <a:r>
-              <a:rPr lang="de-DE" dirty="0"/>
-              <a:t>Subjekt</a:t>
-            </a:r>
-            <a:r>
-              <a:rPr lang="de-DE" sz="1200" dirty="0"/>
-              <a:t>, welches eine Liste von </a:t>
-            </a:r>
-            <a:r>
-              <a:rPr lang="de-DE" sz="1200" dirty="0" err="1"/>
-              <a:t>Observern</a:t>
-            </a:r>
-            <a:r>
-              <a:rPr lang="de-DE" sz="1200" dirty="0"/>
-              <a:t> verwaltet. Observer-Objekte können ein </a:t>
-            </a:r>
-            <a:r>
-              <a:rPr lang="de-DE" dirty="0"/>
-              <a:t>Subjekts</a:t>
-            </a:r>
-            <a:r>
-              <a:rPr lang="de-DE" sz="1200" dirty="0"/>
-              <a:t> abonnieren. </a:t>
-            </a:r>
-          </a:p>
-          <a:p>
-            <a:pPr marL="0" marR="0" lvl="0" indent="0" algn="l" defTabSz="914400" rtl="0" eaLnBrk="1" fontAlgn="auto" latinLnBrk="0" hangingPunct="1">
-              <a:lnSpc>
-                <a:spcPct val="100000"/>
-              </a:lnSpc>
-              <a:spcBef>
-                <a:spcPts val="0"/>
-              </a:spcBef>
-              <a:spcAft>
-                <a:spcPts val="0"/>
-              </a:spcAft>
-              <a:buClrTx/>
-              <a:buSzTx/>
-              <a:buFontTx/>
-              <a:buNone/>
-              <a:tabLst/>
-              <a:defRPr/>
-            </a:pPr>
-            <a:r>
-              <a:rPr lang="de-DE" sz="1200" dirty="0"/>
-              <a:t>Bei Änderung der Daten im </a:t>
-            </a:r>
-            <a:r>
-              <a:rPr lang="de-DE" dirty="0"/>
-              <a:t>Subjekts</a:t>
-            </a:r>
-            <a:r>
-              <a:rPr lang="de-DE" sz="1200" dirty="0"/>
-              <a:t> werden alle zugehörigen Observer informiert und diese können dann ihre Daten aktualisieren.</a:t>
-            </a:r>
-          </a:p>
-          <a:p>
+            </a:br>
             <a:endParaRPr lang="de-DE" dirty="0"/>
           </a:p>
         </p:txBody>
@@ -950,7 +810,7 @@
           <a:p>
             <a:fld id="{9479FC98-DDC4-40A5-90CB-37FFA02134FB}" type="slidenum">
               <a:rPr lang="de-DE" smtClean="0"/>
-              <a:t>4</a:t>
+              <a:t>3</a:t>
             </a:fld>
             <a:endParaRPr lang="de-DE"/>
           </a:p>
@@ -959,7 +819,7 @@
     </p:spTree>
     <p:extLst>
       <p:ext uri="{BB962C8B-B14F-4D97-AF65-F5344CB8AC3E}">
-        <p14:creationId xmlns:p14="http://schemas.microsoft.com/office/powerpoint/2010/main" val="1226971605"/>
+        <p14:creationId xmlns:p14="http://schemas.microsoft.com/office/powerpoint/2010/main" val="1334925992"/>
       </p:ext>
     </p:extLst>
   </p:cSld>
@@ -1013,6 +873,230 @@
           <a:bodyPr/>
           <a:lstStyle/>
           <a:p>
+            <a:pPr marL="0" marR="0" lvl="0" indent="0" algn="l" defTabSz="914400" rtl="0" eaLnBrk="1" fontAlgn="auto" latinLnBrk="0" hangingPunct="1">
+              <a:lnSpc>
+                <a:spcPct val="100000"/>
+              </a:lnSpc>
+              <a:spcBef>
+                <a:spcPts val="0"/>
+              </a:spcBef>
+              <a:spcAft>
+                <a:spcPts val="0"/>
+              </a:spcAft>
+              <a:buClrTx/>
+              <a:buSzTx/>
+              <a:buFontTx/>
+              <a:buNone/>
+              <a:tabLst/>
+              <a:defRPr/>
+            </a:pPr>
+            <a:r>
+              <a:rPr lang="de-DE" sz="1200" dirty="0"/>
+              <a:t>Die Grundidee des Musters, das mehrere Objekte informiert werden, sobald sich der Zustand eines bestimmten </a:t>
+            </a:r>
+            <a:r>
+              <a:rPr lang="de-DE" dirty="0"/>
+              <a:t>Subjekts</a:t>
+            </a:r>
+            <a:r>
+              <a:rPr lang="de-DE" sz="1200" dirty="0"/>
+              <a:t> sich ändert. </a:t>
+            </a:r>
+          </a:p>
+          <a:p>
+            <a:pPr marL="0" marR="0" lvl="0" indent="0" algn="l" defTabSz="914400" rtl="0" eaLnBrk="1" fontAlgn="auto" latinLnBrk="0" hangingPunct="1">
+              <a:lnSpc>
+                <a:spcPct val="100000"/>
+              </a:lnSpc>
+              <a:spcBef>
+                <a:spcPts val="0"/>
+              </a:spcBef>
+              <a:spcAft>
+                <a:spcPts val="0"/>
+              </a:spcAft>
+              <a:buClrTx/>
+              <a:buSzTx/>
+              <a:buFontTx/>
+              <a:buNone/>
+              <a:tabLst/>
+              <a:defRPr/>
+            </a:pPr>
+            <a:r>
+              <a:rPr lang="de-DE" sz="1200" dirty="0"/>
+              <a:t>Das </a:t>
+            </a:r>
+            <a:r>
+              <a:rPr lang="de-DE" dirty="0"/>
+              <a:t>Subjekt</a:t>
+            </a:r>
+            <a:r>
+              <a:rPr lang="de-DE" sz="1200" dirty="0"/>
+              <a:t> ist Objekt, welches wir beobachten. </a:t>
+            </a:r>
+          </a:p>
+          <a:p>
+            <a:pPr marL="0" marR="0" lvl="0" indent="0" algn="l" defTabSz="914400" rtl="0" eaLnBrk="1" fontAlgn="auto" latinLnBrk="0" hangingPunct="1">
+              <a:lnSpc>
+                <a:spcPct val="100000"/>
+              </a:lnSpc>
+              <a:spcBef>
+                <a:spcPts val="0"/>
+              </a:spcBef>
+              <a:spcAft>
+                <a:spcPts val="0"/>
+              </a:spcAft>
+              <a:buClrTx/>
+              <a:buSzTx/>
+              <a:buFontTx/>
+              <a:buNone/>
+              <a:tabLst/>
+              <a:defRPr/>
+            </a:pPr>
+            <a:r>
+              <a:rPr lang="de-DE" sz="1200" dirty="0"/>
+              <a:t>Dabei gibt es ein </a:t>
+            </a:r>
+            <a:r>
+              <a:rPr lang="de-DE" dirty="0"/>
+              <a:t>Subjekt</a:t>
+            </a:r>
+            <a:r>
+              <a:rPr lang="de-DE" sz="1200" dirty="0"/>
+              <a:t>, welches eine Liste von </a:t>
+            </a:r>
+            <a:r>
+              <a:rPr lang="de-DE" sz="1200" dirty="0" err="1"/>
+              <a:t>Observern</a:t>
+            </a:r>
+            <a:r>
+              <a:rPr lang="de-DE" sz="1200" dirty="0"/>
+              <a:t> verwaltet. Observer-Objekte können ein </a:t>
+            </a:r>
+            <a:r>
+              <a:rPr lang="de-DE" dirty="0"/>
+              <a:t>Subjekts</a:t>
+            </a:r>
+            <a:r>
+              <a:rPr lang="de-DE" sz="1200" dirty="0"/>
+              <a:t> abonnieren. </a:t>
+            </a:r>
+          </a:p>
+          <a:p>
+            <a:pPr marL="0" marR="0" lvl="0" indent="0" algn="l" defTabSz="914400" rtl="0" eaLnBrk="1" fontAlgn="auto" latinLnBrk="0" hangingPunct="1">
+              <a:lnSpc>
+                <a:spcPct val="100000"/>
+              </a:lnSpc>
+              <a:spcBef>
+                <a:spcPts val="0"/>
+              </a:spcBef>
+              <a:spcAft>
+                <a:spcPts val="0"/>
+              </a:spcAft>
+              <a:buClrTx/>
+              <a:buSzTx/>
+              <a:buFontTx/>
+              <a:buNone/>
+              <a:tabLst/>
+              <a:defRPr/>
+            </a:pPr>
+            <a:r>
+              <a:rPr lang="de-DE" sz="1200" dirty="0"/>
+              <a:t>Bei Änderung der Daten im </a:t>
+            </a:r>
+            <a:r>
+              <a:rPr lang="de-DE" dirty="0"/>
+              <a:t>Subjekts</a:t>
+            </a:r>
+            <a:r>
+              <a:rPr lang="de-DE" sz="1200" dirty="0"/>
+              <a:t> werden alle zugehörigen Observer informiert und diese können dann ihre Daten aktualisieren.</a:t>
+            </a:r>
+          </a:p>
+          <a:p>
+            <a:endParaRPr lang="de-DE" dirty="0"/>
+          </a:p>
+        </p:txBody>
+      </p:sp>
+      <p:sp>
+        <p:nvSpPr>
+          <p:cNvPr id="4" name="Foliennummernplatzhalter 3"/>
+          <p:cNvSpPr>
+            <a:spLocks noGrp="1"/>
+          </p:cNvSpPr>
+          <p:nvPr>
+            <p:ph type="sldNum" sz="quarter" idx="5"/>
+          </p:nvPr>
+        </p:nvSpPr>
+        <p:spPr/>
+        <p:txBody>
+          <a:bodyPr/>
+          <a:lstStyle/>
+          <a:p>
+            <a:fld id="{9479FC98-DDC4-40A5-90CB-37FFA02134FB}" type="slidenum">
+              <a:rPr lang="de-DE" smtClean="0"/>
+              <a:t>4</a:t>
+            </a:fld>
+            <a:endParaRPr lang="de-DE"/>
+          </a:p>
+        </p:txBody>
+      </p:sp>
+    </p:spTree>
+    <p:extLst>
+      <p:ext uri="{BB962C8B-B14F-4D97-AF65-F5344CB8AC3E}">
+        <p14:creationId xmlns:p14="http://schemas.microsoft.com/office/powerpoint/2010/main" val="1226971605"/>
+      </p:ext>
+    </p:extLst>
+  </p:cSld>
+  <p:clrMapOvr>
+    <a:masterClrMapping/>
+  </p:clrMapOvr>
+</p:notes>
+</file>
+
+<file path=ppt/notesSlides/notesSlide4.xml><?xml version="1.0" encoding="utf-8"?>
+<p:notes xmlns:a="http://schemas.openxmlformats.org/drawingml/2006/main" xmlns:r="http://schemas.openxmlformats.org/officeDocument/2006/relationships" xmlns:p="http://schemas.openxmlformats.org/presentationml/2006/main">
+  <p:cSld>
+    <p:spTree>
+      <p:nvGrpSpPr>
+        <p:cNvPr id="1" name=""/>
+        <p:cNvGrpSpPr/>
+        <p:nvPr/>
+      </p:nvGrpSpPr>
+      <p:grpSpPr>
+        <a:xfrm>
+          <a:off x="0" y="0"/>
+          <a:ext cx="0" cy="0"/>
+          <a:chOff x="0" y="0"/>
+          <a:chExt cx="0" cy="0"/>
+        </a:xfrm>
+      </p:grpSpPr>
+      <p:sp>
+        <p:nvSpPr>
+          <p:cNvPr id="2" name="Folienbildplatzhalter 1"/>
+          <p:cNvSpPr>
+            <a:spLocks noGrp="1" noRot="1" noChangeAspect="1"/>
+          </p:cNvSpPr>
+          <p:nvPr>
+            <p:ph type="sldImg"/>
+          </p:nvPr>
+        </p:nvSpPr>
+        <p:spPr/>
+      </p:sp>
+      <p:sp>
+        <p:nvSpPr>
+          <p:cNvPr id="3" name="Notizenplatzhalter 2"/>
+          <p:cNvSpPr>
+            <a:spLocks noGrp="1"/>
+          </p:cNvSpPr>
+          <p:nvPr>
+            <p:ph type="body" idx="1"/>
+          </p:nvPr>
+        </p:nvSpPr>
+        <p:spPr/>
+        <p:txBody>
+          <a:bodyPr/>
+          <a:lstStyle/>
+          <a:p>
             <a:r>
               <a:rPr lang="de-DE" dirty="0"/>
               <a:t>Das </a:t>
@@ -1132,7 +1216,7 @@
 </p:notes>
 </file>
 
-<file path=ppt/notesSlides/notesSlide4.xml><?xml version="1.0" encoding="utf-8"?>
+<file path=ppt/notesSlides/notesSlide5.xml><?xml version="1.0" encoding="utf-8"?>
 <p:notes xmlns:a="http://schemas.openxmlformats.org/drawingml/2006/main" xmlns:r="http://schemas.openxmlformats.org/officeDocument/2006/relationships" xmlns:p="http://schemas.openxmlformats.org/presentationml/2006/main">
   <p:cSld>
     <p:spTree>
@@ -1742,7 +1826,7 @@
           <a:bodyPr/>
           <a:lstStyle/>
           <a:p>
-            <a:fld id="{3C06F657-8A70-4A9E-8680-EC0362A7C1B2}" type="datetime2">
+            <a:fld id="{0ED6613A-6B38-4C56-B099-9AE4A28A91D3}" type="datetime2">
               <a:rPr lang="de-DE" smtClean="0"/>
               <a:t>Mittwoch, 3. Dezember 2025</a:t>
             </a:fld>
@@ -1767,7 +1851,7 @@
           <a:p>
             <a:r>
               <a:rPr lang="de-DE"/>
-              <a:t>Von: Jasper Högemann, Danilo Schiefer, Mike SChröer</a:t>
+              <a:t>Von: Jasper Högemann, Danilo Schiefer, Mike Schröer</a:t>
             </a:r>
             <a:endParaRPr lang="en-US"/>
           </a:p>
@@ -2037,7 +2121,7 @@
           <a:bodyPr/>
           <a:lstStyle/>
           <a:p>
-            <a:fld id="{B4F708C5-41F9-43BC-8B52-6D1EFE642DC3}" type="datetime2">
+            <a:fld id="{024C6810-2FC2-46F6-ADDA-52C57AF8CA09}" type="datetime2">
               <a:rPr lang="de-DE" smtClean="0"/>
               <a:t>Mittwoch, 3. Dezember 2025</a:t>
             </a:fld>
@@ -2062,7 +2146,7 @@
           <a:p>
             <a:r>
               <a:rPr lang="de-DE"/>
-              <a:t>Von: Jasper Högemann, Danilo Schiefer, Mike SChröer</a:t>
+              <a:t>Von: Jasper Högemann, Danilo Schiefer, Mike Schröer</a:t>
             </a:r>
             <a:endParaRPr lang="en-US"/>
           </a:p>
@@ -2101,7 +2185,6 @@
   <p:clrMapOvr>
     <a:masterClrMapping/>
   </p:clrMapOvr>
-  <p:hf hdr="0"/>
 </p:sldLayout>
 </file>
 
@@ -2301,7 +2384,7 @@
           <a:bodyPr/>
           <a:lstStyle/>
           <a:p>
-            <a:fld id="{B4F708C5-41F9-43BC-8B52-6D1EFE642DC3}" type="datetime2">
+            <a:fld id="{BB140554-E98E-4310-A59E-F1A08FC91858}" type="datetime2">
               <a:rPr lang="de-DE" smtClean="0"/>
               <a:t>Mittwoch, 3. Dezember 2025</a:t>
             </a:fld>
@@ -2326,7 +2409,7 @@
           <a:p>
             <a:r>
               <a:rPr lang="de-DE"/>
-              <a:t>Von: Jasper Högemann, Danilo Schiefer, Mike SChröer</a:t>
+              <a:t>Von: Jasper Högemann, Danilo Schiefer, Mike Schröer</a:t>
             </a:r>
             <a:endParaRPr lang="en-US"/>
           </a:p>
@@ -2365,7 +2448,6 @@
   <p:clrMapOvr>
     <a:masterClrMapping/>
   </p:clrMapOvr>
-  <p:hf hdr="0"/>
 </p:sldLayout>
 </file>
 
@@ -2775,7 +2857,7 @@
           <a:bodyPr/>
           <a:lstStyle/>
           <a:p>
-            <a:fld id="{B4F708C5-41F9-43BC-8B52-6D1EFE642DC3}" type="datetime2">
+            <a:fld id="{3A9BECCA-FABB-4E8C-9CDE-566ACDE29DC6}" type="datetime2">
               <a:rPr lang="de-DE" smtClean="0"/>
               <a:t>Mittwoch, 3. Dezember 2025</a:t>
             </a:fld>
@@ -2800,7 +2882,7 @@
           <a:p>
             <a:r>
               <a:rPr lang="de-DE"/>
-              <a:t>Von: Jasper Högemann, Danilo Schiefer, Mike SChröer</a:t>
+              <a:t>Von: Jasper Högemann, Danilo Schiefer, Mike Schröer</a:t>
             </a:r>
             <a:endParaRPr lang="en-US"/>
           </a:p>
@@ -2839,7 +2921,6 @@
   <p:clrMapOvr>
     <a:masterClrMapping/>
   </p:clrMapOvr>
-  <p:hf hdr="0"/>
 </p:sldLayout>
 </file>
 
@@ -2960,7 +3041,7 @@
           <a:bodyPr/>
           <a:lstStyle/>
           <a:p>
-            <a:fld id="{B4F708C5-41F9-43BC-8B52-6D1EFE642DC3}" type="datetime2">
+            <a:fld id="{55D987B6-5AE4-45A8-8A90-95BC17DADC80}" type="datetime2">
               <a:rPr lang="de-DE" smtClean="0"/>
               <a:t>Mittwoch, 3. Dezember 2025</a:t>
             </a:fld>
@@ -2985,7 +3066,7 @@
           <a:p>
             <a:r>
               <a:rPr lang="de-DE"/>
-              <a:t>Von: Jasper Högemann, Danilo Schiefer, Mike SChröer</a:t>
+              <a:t>Von: Jasper Högemann, Danilo Schiefer, Mike Schröer</a:t>
             </a:r>
             <a:endParaRPr lang="en-US"/>
           </a:p>
@@ -3024,7 +3105,6 @@
   <p:clrMapOvr>
     <a:masterClrMapping/>
   </p:clrMapOvr>
-  <p:hf hdr="0"/>
 </p:sldLayout>
 </file>
 
@@ -3541,7 +3621,7 @@
           <a:bodyPr/>
           <a:lstStyle/>
           <a:p>
-            <a:fld id="{B4F708C5-41F9-43BC-8B52-6D1EFE642DC3}" type="datetime2">
+            <a:fld id="{C5F0FE0C-1F13-41DE-8677-EBC01ABF681F}" type="datetime2">
               <a:rPr lang="de-DE" smtClean="0"/>
               <a:t>Mittwoch, 3. Dezember 2025</a:t>
             </a:fld>
@@ -3566,7 +3646,7 @@
           <a:p>
             <a:r>
               <a:rPr lang="de-DE"/>
-              <a:t>Von: Jasper Högemann, Danilo Schiefer, Mike SChröer</a:t>
+              <a:t>Von: Jasper Högemann, Danilo Schiefer, Mike Schröer</a:t>
             </a:r>
             <a:endParaRPr lang="en-US"/>
           </a:p>
@@ -3605,7 +3685,6 @@
   <p:clrMapOvr>
     <a:masterClrMapping/>
   </p:clrMapOvr>
-  <p:hf hdr="0"/>
 </p:sldLayout>
 </file>
 
@@ -3878,7 +3957,7 @@
           <a:bodyPr/>
           <a:lstStyle/>
           <a:p>
-            <a:fld id="{B4F708C5-41F9-43BC-8B52-6D1EFE642DC3}" type="datetime2">
+            <a:fld id="{435F1877-BECA-4EAC-90F2-7E9F5ACE1766}" type="datetime2">
               <a:rPr lang="de-DE" smtClean="0"/>
               <a:t>Mittwoch, 3. Dezember 2025</a:t>
             </a:fld>
@@ -3903,7 +3982,7 @@
           <a:p>
             <a:r>
               <a:rPr lang="de-DE"/>
-              <a:t>Von: Jasper Högemann, Danilo Schiefer, Mike SChröer</a:t>
+              <a:t>Von: Jasper Högemann, Danilo Schiefer, Mike Schröer</a:t>
             </a:r>
             <a:endParaRPr lang="en-US"/>
           </a:p>
@@ -3942,7 +4021,6 @@
   <p:clrMapOvr>
     <a:masterClrMapping/>
   </p:clrMapOvr>
-  <p:hf hdr="0"/>
 </p:sldLayout>
 </file>
 
@@ -4058,7 +4136,7 @@
           <a:bodyPr/>
           <a:lstStyle/>
           <a:p>
-            <a:fld id="{0A14B465-6954-4C35-A00B-039D68DE2B25}" type="datetime2">
+            <a:fld id="{0F92655E-22C5-4299-9510-794C0990FD4D}" type="datetime2">
               <a:rPr lang="de-DE" smtClean="0"/>
               <a:t>Mittwoch, 3. Dezember 2025</a:t>
             </a:fld>
@@ -4083,7 +4161,7 @@
           <a:p>
             <a:r>
               <a:rPr lang="de-DE"/>
-              <a:t>Von: Jasper Högemann, Danilo Schiefer, Mike SChröer</a:t>
+              <a:t>Von: Jasper Högemann, Danilo Schiefer, Mike Schröer</a:t>
             </a:r>
             <a:endParaRPr lang="en-US"/>
           </a:p>
@@ -4242,7 +4320,7 @@
           <a:bodyPr/>
           <a:lstStyle/>
           <a:p>
-            <a:fld id="{3F035CDA-45F3-41C3-91A1-2AFC27A12227}" type="datetime2">
+            <a:fld id="{DB94E45E-BE2F-44E1-888A-96E3054EEF84}" type="datetime2">
               <a:rPr lang="de-DE" smtClean="0"/>
               <a:t>Mittwoch, 3. Dezember 2025</a:t>
             </a:fld>
@@ -4267,7 +4345,7 @@
           <a:p>
             <a:r>
               <a:rPr lang="de-DE"/>
-              <a:t>Von: Jasper Högemann, Danilo Schiefer, Mike SChröer</a:t>
+              <a:t>Von: Jasper Högemann, Danilo Schiefer, Mike Schröer</a:t>
             </a:r>
             <a:endParaRPr lang="en-US"/>
           </a:p>
@@ -4416,7 +4494,7 @@
           <a:bodyPr/>
           <a:lstStyle/>
           <a:p>
-            <a:fld id="{0990A61C-8A35-43B9-89FD-0F14341C3F3C}" type="datetime2">
+            <a:fld id="{1172EFA8-AEE5-4336-B37C-EC476F51836D}" type="datetime2">
               <a:rPr lang="de-DE" smtClean="0"/>
               <a:t>Mittwoch, 3. Dezember 2025</a:t>
             </a:fld>
@@ -4441,7 +4519,7 @@
           <a:p>
             <a:r>
               <a:rPr lang="de-DE"/>
-              <a:t>Von: Jasper Högemann, Danilo Schiefer, Mike SChröer</a:t>
+              <a:t>Von: Jasper Högemann, Danilo Schiefer, Mike Schröer</a:t>
             </a:r>
             <a:endParaRPr lang="en-US"/>
           </a:p>
@@ -4677,7 +4755,7 @@
           <a:bodyPr/>
           <a:lstStyle/>
           <a:p>
-            <a:fld id="{FE15F849-CA23-46D9-A838-54BB3E2B9C19}" type="datetime2">
+            <a:fld id="{B9628E6E-630E-49B8-98D7-C1A7C57937EA}" type="datetime2">
               <a:rPr lang="de-DE" smtClean="0"/>
               <a:t>Mittwoch, 3. Dezember 2025</a:t>
             </a:fld>
@@ -4702,7 +4780,7 @@
           <a:p>
             <a:r>
               <a:rPr lang="de-DE"/>
-              <a:t>Von: Jasper Högemann, Danilo Schiefer, Mike SChröer</a:t>
+              <a:t>Von: Jasper Högemann, Danilo Schiefer, Mike Schröer</a:t>
             </a:r>
             <a:endParaRPr lang="en-US"/>
           </a:p>
@@ -4973,7 +5051,7 @@
           <a:bodyPr/>
           <a:lstStyle/>
           <a:p>
-            <a:fld id="{7DACDD20-5AC8-4B6C-B81D-41260ACFD7CE}" type="datetime2">
+            <a:fld id="{31D6BA10-FD54-46A1-A585-09A27031A5F4}" type="datetime2">
               <a:rPr lang="de-DE" smtClean="0"/>
               <a:t>Mittwoch, 3. Dezember 2025</a:t>
             </a:fld>
@@ -4998,7 +5076,7 @@
           <a:p>
             <a:r>
               <a:rPr lang="de-DE"/>
-              <a:t>Von: Jasper Högemann, Danilo Schiefer, Mike SChröer</a:t>
+              <a:t>Von: Jasper Högemann, Danilo Schiefer, Mike Schröer</a:t>
             </a:r>
             <a:endParaRPr lang="en-US"/>
           </a:p>
@@ -5407,7 +5485,7 @@
           <a:bodyPr/>
           <a:lstStyle/>
           <a:p>
-            <a:fld id="{75A975B9-B801-4748-AF54-F3388BCB44A7}" type="datetime2">
+            <a:fld id="{D12ABEFC-03C0-4A1E-BC38-4EBD49A068F9}" type="datetime2">
               <a:rPr lang="de-DE" smtClean="0"/>
               <a:t>Mittwoch, 3. Dezember 2025</a:t>
             </a:fld>
@@ -5432,7 +5510,7 @@
           <a:p>
             <a:r>
               <a:rPr lang="de-DE"/>
-              <a:t>Von: Jasper Högemann, Danilo Schiefer, Mike SChröer</a:t>
+              <a:t>Von: Jasper Högemann, Danilo Schiefer, Mike Schröer</a:t>
             </a:r>
             <a:endParaRPr lang="en-US"/>
           </a:p>
@@ -5529,7 +5607,7 @@
           <a:bodyPr/>
           <a:lstStyle/>
           <a:p>
-            <a:fld id="{640467BD-D474-4ABE-A6AF-C0F55E8C147B}" type="datetime2">
+            <a:fld id="{546C7EE6-C2EE-4C6A-AAF0-9CA0976525EF}" type="datetime2">
               <a:rPr lang="de-DE" smtClean="0"/>
               <a:t>Mittwoch, 3. Dezember 2025</a:t>
             </a:fld>
@@ -5554,7 +5632,7 @@
           <a:p>
             <a:r>
               <a:rPr lang="de-DE"/>
-              <a:t>Von: Jasper Högemann, Danilo Schiefer, Mike SChröer</a:t>
+              <a:t>Von: Jasper Högemann, Danilo Schiefer, Mike Schröer</a:t>
             </a:r>
             <a:endParaRPr lang="en-US"/>
           </a:p>
@@ -5628,7 +5706,7 @@
           <a:bodyPr/>
           <a:lstStyle/>
           <a:p>
-            <a:fld id="{13317DE4-8E9D-487E-B8F8-AD8DE7E15E41}" type="datetime2">
+            <a:fld id="{BC1FD859-A00E-42C3-84DD-2C83B1636291}" type="datetime2">
               <a:rPr lang="de-DE" smtClean="0"/>
               <a:t>Mittwoch, 3. Dezember 2025</a:t>
             </a:fld>
@@ -5653,7 +5731,7 @@
           <a:p>
             <a:r>
               <a:rPr lang="de-DE"/>
-              <a:t>Von: Jasper Högemann, Danilo Schiefer, Mike SChröer</a:t>
+              <a:t>Von: Jasper Högemann, Danilo Schiefer, Mike Schröer</a:t>
             </a:r>
             <a:endParaRPr lang="en-US"/>
           </a:p>
@@ -5915,7 +5993,7 @@
           <a:bodyPr/>
           <a:lstStyle/>
           <a:p>
-            <a:fld id="{6C5681B7-8BEA-45A6-834E-230CEA58D401}" type="datetime2">
+            <a:fld id="{8C41A387-8BC6-46BF-A007-E324CD110F84}" type="datetime2">
               <a:rPr lang="de-DE" smtClean="0"/>
               <a:t>Mittwoch, 3. Dezember 2025</a:t>
             </a:fld>
@@ -5940,7 +6018,7 @@
           <a:p>
             <a:r>
               <a:rPr lang="de-DE"/>
-              <a:t>Von: Jasper Högemann, Danilo Schiefer, Mike SChröer</a:t>
+              <a:t>Von: Jasper Högemann, Danilo Schiefer, Mike Schröer</a:t>
             </a:r>
             <a:endParaRPr lang="en-US"/>
           </a:p>
@@ -6210,7 +6288,7 @@
           <a:bodyPr/>
           <a:lstStyle/>
           <a:p>
-            <a:fld id="{B4F708C5-41F9-43BC-8B52-6D1EFE642DC3}" type="datetime2">
+            <a:fld id="{312A4E92-5864-45A4-BFBF-F9F517D733AB}" type="datetime2">
               <a:rPr lang="de-DE" smtClean="0"/>
               <a:t>Mittwoch, 3. Dezember 2025</a:t>
             </a:fld>
@@ -6240,7 +6318,7 @@
           <a:p>
             <a:r>
               <a:rPr lang="de-DE"/>
-              <a:t>Von: Jasper Högemann, Danilo Schiefer, Mike SChröer</a:t>
+              <a:t>Von: Jasper Högemann, Danilo Schiefer, Mike Schröer</a:t>
             </a:r>
             <a:endParaRPr lang="en-US"/>
           </a:p>
@@ -6284,7 +6362,6 @@
   <p:clrMapOvr>
     <a:masterClrMapping/>
   </p:clrMapOvr>
-  <p:hf hdr="0"/>
 </p:sldLayout>
 </file>
 
@@ -6446,7 +6523,7 @@
             </a:lvl1pPr>
           </a:lstStyle>
           <a:p>
-            <a:fld id="{B4F708C5-41F9-43BC-8B52-6D1EFE642DC3}" type="datetime2">
+            <a:fld id="{7A096B2B-C2DA-4FA7-A181-90AB72A92B04}" type="datetime2">
               <a:rPr lang="de-DE" smtClean="0"/>
               <a:t>Mittwoch, 3. Dezember 2025</a:t>
             </a:fld>
@@ -6497,7 +6574,7 @@
           <a:p>
             <a:r>
               <a:rPr lang="de-DE"/>
-              <a:t>Von: Jasper Högemann, Danilo Schiefer, Mike SChröer</a:t>
+              <a:t>Von: Jasper Högemann, Danilo Schiefer, Mike Schröer</a:t>
             </a:r>
             <a:endParaRPr lang="en-US"/>
           </a:p>
@@ -7299,7 +7376,7 @@
           <a:bodyPr/>
           <a:lstStyle/>
           <a:p>
-            <a:fld id="{3C06F657-8A70-4A9E-8680-EC0362A7C1B2}" type="datetime2">
+            <a:fld id="{ED4F7C6E-8B39-46CC-8194-062257D1545A}" type="datetime2">
               <a:rPr lang="de-DE" smtClean="0"/>
               <a:t>Mittwoch, 3. Dezember 2025</a:t>
             </a:fld>
@@ -7329,10 +7406,18 @@
           <a:lstStyle/>
           <a:p>
             <a:r>
-              <a:rPr lang="de-DE"/>
-              <a:t>Von: Jasper Högemann, Danilo Schiefer, Mike SChröer</a:t>
-            </a:r>
-            <a:endParaRPr lang="en-US"/>
+              <a:rPr lang="de-DE" dirty="0"/>
+              <a:t>Von: Jasper </a:t>
+            </a:r>
+            <a:r>
+              <a:rPr lang="de-DE" dirty="0" err="1"/>
+              <a:t>Högemann</a:t>
+            </a:r>
+            <a:r>
+              <a:rPr lang="de-DE" dirty="0"/>
+              <a:t>, Danilo Schiefer, Mike Schröer</a:t>
+            </a:r>
+            <a:endParaRPr lang="en-US" dirty="0"/>
           </a:p>
         </p:txBody>
       </p:sp>
@@ -7506,7 +7591,7 @@
           <a:bodyPr/>
           <a:lstStyle/>
           <a:p>
-            <a:fld id="{0990A61C-8A35-43B9-89FD-0F14341C3F3C}" type="datetime2">
+            <a:fld id="{C5EDDD45-B8B2-4660-A473-8A6C5B1E0F19}" type="datetime2">
               <a:rPr lang="de-DE" smtClean="0"/>
               <a:t>Mittwoch, 3. Dezember 2025</a:t>
             </a:fld>
@@ -7537,7 +7622,7 @@
           <a:p>
             <a:r>
               <a:rPr lang="de-DE"/>
-              <a:t>Von: Jasper Högemann, Danilo Schiefer, Mike SChröer</a:t>
+              <a:t>Von: Jasper Högemann, Danilo Schiefer, Mike Schröer</a:t>
             </a:r>
             <a:endParaRPr lang="en-US"/>
           </a:p>
@@ -7698,7 +7783,7 @@
           <a:bodyPr/>
           <a:lstStyle/>
           <a:p>
-            <a:fld id="{0990A61C-8A35-43B9-89FD-0F14341C3F3C}" type="datetime2">
+            <a:fld id="{841904B6-C57F-4F8A-9151-4C73D17B1557}" type="datetime2">
               <a:rPr lang="de-DE" smtClean="0"/>
               <a:t>Mittwoch, 3. Dezember 2025</a:t>
             </a:fld>
@@ -7729,7 +7814,7 @@
           <a:p>
             <a:r>
               <a:rPr lang="de-DE"/>
-              <a:t>Von: Jasper Högemann, Danilo Schiefer, Mike SChröer</a:t>
+              <a:t>Von: Jasper Högemann, Danilo Schiefer, Mike Schröer</a:t>
             </a:r>
             <a:endParaRPr lang="en-US"/>
           </a:p>
@@ -7986,7 +8071,7 @@
           <a:bodyPr/>
           <a:lstStyle/>
           <a:p>
-            <a:fld id="{0990A61C-8A35-43B9-89FD-0F14341C3F3C}" type="datetime2">
+            <a:fld id="{EF3132A9-5DED-49E1-9379-27AB16C74881}" type="datetime2">
               <a:rPr lang="de-DE" smtClean="0"/>
               <a:t>Mittwoch, 3. Dezember 2025</a:t>
             </a:fld>
@@ -8017,7 +8102,7 @@
           <a:p>
             <a:r>
               <a:rPr lang="de-DE"/>
-              <a:t>Von: Jasper Högemann, Danilo Schiefer, Mike SChröer</a:t>
+              <a:t>Von: Jasper Högemann, Danilo Schiefer, Mike Schröer</a:t>
             </a:r>
             <a:endParaRPr lang="en-US"/>
           </a:p>
@@ -8138,7 +8223,7 @@
           <a:bodyPr/>
           <a:lstStyle/>
           <a:p>
-            <a:fld id="{0990A61C-8A35-43B9-89FD-0F14341C3F3C}" type="datetime2">
+            <a:fld id="{B3E8B857-05F6-421F-993F-A11E58C46304}" type="datetime2">
               <a:rPr lang="de-DE" smtClean="0"/>
               <a:t>Mittwoch, 3. Dezember 2025</a:t>
             </a:fld>
@@ -8169,7 +8254,7 @@
           <a:p>
             <a:r>
               <a:rPr lang="de-DE"/>
-              <a:t>Von: Jasper Högemann, Danilo Schiefer, Mike SChröer</a:t>
+              <a:t>Von: Jasper Högemann, Danilo Schiefer, Mike Schröer</a:t>
             </a:r>
             <a:endParaRPr lang="en-US"/>
           </a:p>
@@ -8385,7 +8470,7 @@
           <a:bodyPr/>
           <a:lstStyle/>
           <a:p>
-            <a:fld id="{7DACDD20-5AC8-4B6C-B81D-41260ACFD7CE}" type="datetime2">
+            <a:fld id="{A9EEFF9C-AD3B-406F-BFE1-938C1C030B3F}" type="datetime2">
               <a:rPr lang="de-DE" smtClean="0"/>
               <a:t>Mittwoch, 3. Dezember 2025</a:t>
             </a:fld>
@@ -8416,7 +8501,7 @@
           <a:p>
             <a:r>
               <a:rPr lang="de-DE"/>
-              <a:t>Von: Jasper Högemann, Danilo Schiefer, Mike SChröer</a:t>
+              <a:t>Von: Jasper Högemann, Danilo Schiefer, Mike Schröer</a:t>
             </a:r>
             <a:endParaRPr lang="en-US"/>
           </a:p>
@@ -8600,7 +8685,7 @@
           <a:bodyPr/>
           <a:lstStyle/>
           <a:p>
-            <a:fld id="{0990A61C-8A35-43B9-89FD-0F14341C3F3C}" type="datetime2">
+            <a:fld id="{B4C787A8-D875-4238-ABFD-D1A2E43E94C7}" type="datetime2">
               <a:rPr lang="de-DE" smtClean="0"/>
               <a:t>Mittwoch, 3. Dezember 2025</a:t>
             </a:fld>
@@ -8631,7 +8716,7 @@
           <a:p>
             <a:r>
               <a:rPr lang="de-DE"/>
-              <a:t>Von: Jasper Högemann, Danilo Schiefer, Mike SChröer</a:t>
+              <a:t>Von: Jasper Högemann, Danilo Schiefer, Mike Schröer</a:t>
             </a:r>
             <a:endParaRPr lang="en-US"/>
           </a:p>
@@ -8822,7 +8907,7 @@
           <a:bodyPr/>
           <a:lstStyle/>
           <a:p>
-            <a:fld id="{0990A61C-8A35-43B9-89FD-0F14341C3F3C}" type="datetime2">
+            <a:fld id="{CC18D281-CB69-48EF-B029-CE75DC3AA0FC}" type="datetime2">
               <a:rPr lang="de-DE" smtClean="0"/>
               <a:t>Mittwoch, 3. Dezember 2025</a:t>
             </a:fld>
@@ -8853,7 +8938,7 @@
           <a:p>
             <a:r>
               <a:rPr lang="de-DE"/>
-              <a:t>Von: Jasper Högemann, Danilo Schiefer, Mike SChröer</a:t>
+              <a:t>Von: Jasper Högemann, Danilo Schiefer, Mike Schröer</a:t>
             </a:r>
             <a:endParaRPr lang="en-US"/>
           </a:p>
@@ -9008,7 +9093,7 @@
           <a:bodyPr/>
           <a:lstStyle/>
           <a:p>
-            <a:fld id="{3C06F657-8A70-4A9E-8680-EC0362A7C1B2}" type="datetime2">
+            <a:fld id="{607F2CB2-E116-49AD-83EB-7953A6DA2226}" type="datetime2">
               <a:rPr lang="de-DE" smtClean="0"/>
               <a:t>Mittwoch, 3. Dezember 2025</a:t>
             </a:fld>
@@ -9039,7 +9124,7 @@
           <a:p>
             <a:r>
               <a:rPr lang="de-DE"/>
-              <a:t>Von: Jasper Högemann, Danilo Schiefer, Mike SChröer</a:t>
+              <a:t>Von: Jasper Högemann, Danilo Schiefer, Mike Schröer</a:t>
             </a:r>
             <a:endParaRPr lang="en-US"/>
           </a:p>

</xml_diff>